<commit_message>
update link to repo
</commit_message>
<xml_diff>
--- a/VsCodeExtensions.pptx
+++ b/VsCodeExtensions.pptx
@@ -18597,7 +18597,7 @@
         <p:spPr>
           <a:xfrm>
             <a:off x="1886858" y="857250"/>
-            <a:ext cx="11105242" cy="7155805"/>
+            <a:ext cx="11105242" cy="8817799"/>
           </a:xfrm>
           <a:prstGeom prst="rect">
             <a:avLst/>
@@ -18661,12 +18661,36 @@
               </a:rPr>
               <a:t>https://github.com/GoranSiska</a:t>
             </a:r>
-            <a:endParaRPr lang="sl-SI" sz="5400" dirty="0">
+            <a:endParaRPr lang="en-US" sz="5400" dirty="0">
               <a:latin typeface="Helvetica" panose="020B0604020202020204" pitchFamily="34" charset="0"/>
               <a:cs typeface="Helvetica" panose="020B0604020202020204" pitchFamily="34" charset="0"/>
             </a:endParaRPr>
           </a:p>
           <a:p>
+            <a:pPr>
+              <a:lnSpc>
+                <a:spcPct val="150000"/>
+              </a:lnSpc>
+            </a:pPr>
+            <a:r>
+              <a:rPr lang="sl-SI" sz="5400" dirty="0">
+                <a:latin typeface="Helvetica" panose="020B0604020202020204" pitchFamily="34" charset="0"/>
+                <a:cs typeface="Helvetica" panose="020B0604020202020204" pitchFamily="34" charset="0"/>
+                <a:hlinkClick r:id="rId5"/>
+              </a:rPr>
+              <a:t>Ntk2019_VSCodeExtensions</a:t>
+            </a:r>
+            <a:endParaRPr lang="en-US" sz="5400" dirty="0">
+              <a:latin typeface="Helvetica" panose="020B0604020202020204" pitchFamily="34" charset="0"/>
+              <a:cs typeface="Helvetica" panose="020B0604020202020204" pitchFamily="34" charset="0"/>
+            </a:endParaRPr>
+          </a:p>
+          <a:p>
+            <a:pPr>
+              <a:lnSpc>
+                <a:spcPct val="150000"/>
+              </a:lnSpc>
+            </a:pPr>
             <a:endParaRPr lang="sl-SI" sz="5400" dirty="0">
               <a:latin typeface="Helvetica" panose="020B0604020202020204" pitchFamily="34" charset="0"/>
               <a:cs typeface="Helvetica" panose="020B0604020202020204" pitchFamily="34" charset="0"/>
@@ -20144,11 +20168,11 @@
           </p:nvPr>
         </p:nvPicPr>
         <p:blipFill rotWithShape="1">
-          <a:blip r:embed="rId5">
+          <a:blip r:embed="rId6">
             <a:extLst>
               <a:ext uri="{BEBA8EAE-BF5A-486C-A8C5-ECC9F3942E4B}">
                 <a14:imgProps xmlns:a14="http://schemas.microsoft.com/office/drawing/2010/main">
-                  <a14:imgLayer r:embed="rId6">
+                  <a14:imgLayer r:embed="rId7">
                     <a14:imgEffect>
                       <a14:sharpenSoften amount="-11000"/>
                     </a14:imgEffect>

</xml_diff>